<commit_message>
Updated Rules and standards.
</commit_message>
<xml_diff>
--- a/Rules and standards.pptx
+++ b/Rules and standards.pptx
@@ -838,7 +838,7 @@
           <a:p>
             <a:fld id="{4F1E2172-F2CE-4687-98EE-93B0BF135804}" type="datetimeFigureOut">
               <a:rPr lang="en-US" smtClean="0"/>
-              <a:t>11/2/2022</a:t>
+              <a:t>11/9/2022</a:t>
             </a:fld>
             <a:endParaRPr lang="en-US"/>
           </a:p>
@@ -1089,7 +1089,7 @@
           <a:p>
             <a:fld id="{4F1E2172-F2CE-4687-98EE-93B0BF135804}" type="datetimeFigureOut">
               <a:rPr lang="en-US" smtClean="0"/>
-              <a:t>11/2/2022</a:t>
+              <a:t>11/9/2022</a:t>
             </a:fld>
             <a:endParaRPr lang="en-US"/>
           </a:p>
@@ -1403,7 +1403,7 @@
           <a:p>
             <a:fld id="{4F1E2172-F2CE-4687-98EE-93B0BF135804}" type="datetimeFigureOut">
               <a:rPr lang="en-US" smtClean="0"/>
-              <a:t>11/2/2022</a:t>
+              <a:t>11/9/2022</a:t>
             </a:fld>
             <a:endParaRPr lang="en-US"/>
           </a:p>
@@ -1744,7 +1744,7 @@
           <a:p>
             <a:fld id="{4F1E2172-F2CE-4687-98EE-93B0BF135804}" type="datetimeFigureOut">
               <a:rPr lang="en-US" smtClean="0"/>
-              <a:t>11/2/2022</a:t>
+              <a:t>11/9/2022</a:t>
             </a:fld>
             <a:endParaRPr lang="en-US"/>
           </a:p>
@@ -2058,7 +2058,7 @@
           <a:p>
             <a:fld id="{4F1E2172-F2CE-4687-98EE-93B0BF135804}" type="datetimeFigureOut">
               <a:rPr lang="en-US" smtClean="0"/>
-              <a:t>11/2/2022</a:t>
+              <a:t>11/9/2022</a:t>
             </a:fld>
             <a:endParaRPr lang="en-US"/>
           </a:p>
@@ -2451,7 +2451,7 @@
           <a:p>
             <a:fld id="{4F1E2172-F2CE-4687-98EE-93B0BF135804}" type="datetimeFigureOut">
               <a:rPr lang="en-US" smtClean="0"/>
-              <a:t>11/2/2022</a:t>
+              <a:t>11/9/2022</a:t>
             </a:fld>
             <a:endParaRPr lang="en-US"/>
           </a:p>
@@ -2621,7 +2621,7 @@
           <a:p>
             <a:fld id="{4F1E2172-F2CE-4687-98EE-93B0BF135804}" type="datetimeFigureOut">
               <a:rPr lang="en-US" smtClean="0"/>
-              <a:t>11/2/2022</a:t>
+              <a:t>11/9/2022</a:t>
             </a:fld>
             <a:endParaRPr lang="en-US"/>
           </a:p>
@@ -2801,7 +2801,7 @@
           <a:p>
             <a:fld id="{4F1E2172-F2CE-4687-98EE-93B0BF135804}" type="datetimeFigureOut">
               <a:rPr lang="en-US" smtClean="0"/>
-              <a:t>11/2/2022</a:t>
+              <a:t>11/9/2022</a:t>
             </a:fld>
             <a:endParaRPr lang="en-US"/>
           </a:p>
@@ -2977,7 +2977,7 @@
           <a:p>
             <a:fld id="{4F1E2172-F2CE-4687-98EE-93B0BF135804}" type="datetimeFigureOut">
               <a:rPr lang="en-US" smtClean="0"/>
-              <a:t>11/2/2022</a:t>
+              <a:t>11/9/2022</a:t>
             </a:fld>
             <a:endParaRPr lang="en-US"/>
           </a:p>
@@ -3224,7 +3224,7 @@
           <a:p>
             <a:fld id="{4F1E2172-F2CE-4687-98EE-93B0BF135804}" type="datetimeFigureOut">
               <a:rPr lang="en-US" smtClean="0"/>
-              <a:t>11/2/2022</a:t>
+              <a:t>11/9/2022</a:t>
             </a:fld>
             <a:endParaRPr lang="en-US"/>
           </a:p>
@@ -3456,7 +3456,7 @@
           <a:p>
             <a:fld id="{4F1E2172-F2CE-4687-98EE-93B0BF135804}" type="datetimeFigureOut">
               <a:rPr lang="en-US" smtClean="0"/>
-              <a:t>11/2/2022</a:t>
+              <a:t>11/9/2022</a:t>
             </a:fld>
             <a:endParaRPr lang="en-US"/>
           </a:p>
@@ -3830,7 +3830,7 @@
           <a:p>
             <a:fld id="{4F1E2172-F2CE-4687-98EE-93B0BF135804}" type="datetimeFigureOut">
               <a:rPr lang="en-US" smtClean="0"/>
-              <a:t>11/2/2022</a:t>
+              <a:t>11/9/2022</a:t>
             </a:fld>
             <a:endParaRPr lang="en-US"/>
           </a:p>
@@ -3953,7 +3953,7 @@
           <a:p>
             <a:fld id="{4F1E2172-F2CE-4687-98EE-93B0BF135804}" type="datetimeFigureOut">
               <a:rPr lang="en-US" smtClean="0"/>
-              <a:t>11/2/2022</a:t>
+              <a:t>11/9/2022</a:t>
             </a:fld>
             <a:endParaRPr lang="en-US"/>
           </a:p>
@@ -4048,7 +4048,7 @@
           <a:p>
             <a:fld id="{4F1E2172-F2CE-4687-98EE-93B0BF135804}" type="datetimeFigureOut">
               <a:rPr lang="en-US" smtClean="0"/>
-              <a:t>11/2/2022</a:t>
+              <a:t>11/9/2022</a:t>
             </a:fld>
             <a:endParaRPr lang="en-US"/>
           </a:p>
@@ -4303,7 +4303,7 @@
           <a:p>
             <a:fld id="{4F1E2172-F2CE-4687-98EE-93B0BF135804}" type="datetimeFigureOut">
               <a:rPr lang="en-US" smtClean="0"/>
-              <a:t>11/2/2022</a:t>
+              <a:t>11/9/2022</a:t>
             </a:fld>
             <a:endParaRPr lang="en-US"/>
           </a:p>
@@ -4566,7 +4566,7 @@
           <a:p>
             <a:fld id="{4F1E2172-F2CE-4687-98EE-93B0BF135804}" type="datetimeFigureOut">
               <a:rPr lang="en-US" smtClean="0"/>
-              <a:t>11/2/2022</a:t>
+              <a:t>11/9/2022</a:t>
             </a:fld>
             <a:endParaRPr lang="en-US"/>
           </a:p>
@@ -5309,7 +5309,7 @@
           <a:p>
             <a:fld id="{4F1E2172-F2CE-4687-98EE-93B0BF135804}" type="datetimeFigureOut">
               <a:rPr lang="en-US" smtClean="0"/>
-              <a:t>11/2/2022</a:t>
+              <a:t>11/9/2022</a:t>
             </a:fld>
             <a:endParaRPr lang="en-US"/>
           </a:p>
@@ -7020,7 +7020,7 @@
                   <a:srgbClr val="FFFFFF"/>
                 </a:solidFill>
               </a:rPr>
-              <a:t>LA MAIN IN BRANCHUL VOSTRU (NU INVERS).</a:t>
+              <a:t>LA DEVELOPMENT BRANCH IN BRANCHUL VOSTRU (NU INVERS).</a:t>
             </a:r>
           </a:p>
           <a:p>
@@ -7859,6 +7859,88 @@
             <a:normAutofit/>
           </a:bodyPr>
           <a:lstStyle/>
+          <a:p>
+            <a:r>
+              <a:rPr lang="en-US" dirty="0" err="1">
+                <a:solidFill>
+                  <a:srgbClr val="FFFFFF"/>
+                </a:solidFill>
+              </a:rPr>
+              <a:t>Validarile</a:t>
+            </a:r>
+            <a:r>
+              <a:rPr lang="en-US" dirty="0">
+                <a:solidFill>
+                  <a:srgbClr val="FFFFFF"/>
+                </a:solidFill>
+              </a:rPr>
+              <a:t> de </a:t>
+            </a:r>
+            <a:r>
+              <a:rPr lang="en-US" dirty="0" err="1">
+                <a:solidFill>
+                  <a:srgbClr val="FFFFFF"/>
+                </a:solidFill>
+              </a:rPr>
+              <a:t>caractere</a:t>
+            </a:r>
+            <a:r>
+              <a:rPr lang="en-US" dirty="0">
+                <a:solidFill>
+                  <a:srgbClr val="FFFFFF"/>
+                </a:solidFill>
+              </a:rPr>
+              <a:t> se fac pe frontend </a:t>
+            </a:r>
+            <a:r>
+              <a:rPr lang="en-US" dirty="0" err="1">
+                <a:solidFill>
+                  <a:srgbClr val="FFFFFF"/>
+                </a:solidFill>
+              </a:rPr>
+              <a:t>si</a:t>
+            </a:r>
+            <a:r>
+              <a:rPr lang="en-US" dirty="0">
+                <a:solidFill>
+                  <a:srgbClr val="FFFFFF"/>
+                </a:solidFill>
+              </a:rPr>
+              <a:t> </a:t>
+            </a:r>
+            <a:r>
+              <a:rPr lang="en-US" dirty="0" err="1">
+                <a:solidFill>
+                  <a:srgbClr val="FFFFFF"/>
+                </a:solidFill>
+              </a:rPr>
+              <a:t>validarile</a:t>
+            </a:r>
+            <a:r>
+              <a:rPr lang="en-US" dirty="0">
+                <a:solidFill>
+                  <a:srgbClr val="FFFFFF"/>
+                </a:solidFill>
+              </a:rPr>
+              <a:t> din </a:t>
+            </a:r>
+            <a:r>
+              <a:rPr lang="en-US" dirty="0" err="1">
+                <a:solidFill>
+                  <a:srgbClr val="FFFFFF"/>
+                </a:solidFill>
+              </a:rPr>
+              <a:t>db</a:t>
+            </a:r>
+            <a:r>
+              <a:rPr lang="en-US" dirty="0">
+                <a:solidFill>
+                  <a:srgbClr val="FFFFFF"/>
+                </a:solidFill>
+              </a:rPr>
+              <a:t> se fac in backend</a:t>
+            </a:r>
+          </a:p>
           <a:p>
             <a:r>
               <a:rPr lang="en-US" dirty="0" err="1">

</xml_diff>